<commit_message>
Added Course MAterials - Day 8 and 9.
</commit_message>
<xml_diff>
--- a/2. Spring 5.0/Day 6/Slides/8. JPA Annotations and How to Use Them/jpa-annotations-and-how-to-use-them-slides.pptx
+++ b/2. Spring 5.0/Day 6/Slides/8. JPA Annotations and How to Use Them/jpa-annotations-and-how-to-use-them-slides.pptx
@@ -3013,8 +3013,8 @@
         </p:nvSpPr>
         <p:spPr>
           <a:xfrm>
-            <a:off x="1147710" y="5273002"/>
-            <a:ext cx="16612869" cy="628650"/>
+            <a:off x="1136650" y="5273675"/>
+            <a:ext cx="18331815" cy="621030"/>
           </a:xfrm>
           <a:prstGeom prst="rect">
             <a:avLst/>
@@ -3162,7 +3162,27 @@
                 <a:latin typeface="Courier New" panose="02070309020205020404"/>
                 <a:cs typeface="Courier New" panose="02070309020205020404"/>
               </a:rPr>
-              <a:t>Registration”);</a:t>
+              <a:t>Registration</a:t>
+            </a:r>
+            <a:r>
+              <a:rPr lang="en-US" sz="3950" dirty="0">
+                <a:solidFill>
+                  <a:srgbClr val="000000"/>
+                </a:solidFill>
+                <a:latin typeface="Courier New" panose="02070309020205020404"/>
+                <a:cs typeface="Courier New" panose="02070309020205020404"/>
+              </a:rPr>
+              <a:t> r</a:t>
+            </a:r>
+            <a:r>
+              <a:rPr sz="3950" dirty="0">
+                <a:solidFill>
+                  <a:srgbClr val="000000"/>
+                </a:solidFill>
+                <a:latin typeface="Courier New" panose="02070309020205020404"/>
+                <a:cs typeface="Courier New" panose="02070309020205020404"/>
+              </a:rPr>
+              <a:t>”);</a:t>
             </a:r>
             <a:endParaRPr sz="3950">
               <a:latin typeface="Courier New" panose="02070309020205020404"/>

</xml_diff>